<commit_message>
Se genera crea clase CSPMulticlass
</commit_message>
<xml_diff>
--- a/Desarrollo/PythonScripts/bloques y diagramas.pptx
+++ b/Desarrollo/PythonScripts/bloques y diagramas.pptx
@@ -244,7 +244,7 @@
           <a:p>
             <a:fld id="{9846D6DE-BF85-4A33-B9EA-55968A0DA751}" type="datetimeFigureOut">
               <a:rPr lang="es-UY" smtClean="0"/>
-              <a:t>10/3/2023</a:t>
+              <a:t>11/3/2023</a:t>
             </a:fld>
             <a:endParaRPr lang="es-UY"/>
           </a:p>
@@ -414,7 +414,7 @@
           <a:p>
             <a:fld id="{9846D6DE-BF85-4A33-B9EA-55968A0DA751}" type="datetimeFigureOut">
               <a:rPr lang="es-UY" smtClean="0"/>
-              <a:t>10/3/2023</a:t>
+              <a:t>11/3/2023</a:t>
             </a:fld>
             <a:endParaRPr lang="es-UY"/>
           </a:p>
@@ -594,7 +594,7 @@
           <a:p>
             <a:fld id="{9846D6DE-BF85-4A33-B9EA-55968A0DA751}" type="datetimeFigureOut">
               <a:rPr lang="es-UY" smtClean="0"/>
-              <a:t>10/3/2023</a:t>
+              <a:t>11/3/2023</a:t>
             </a:fld>
             <a:endParaRPr lang="es-UY"/>
           </a:p>
@@ -764,7 +764,7 @@
           <a:p>
             <a:fld id="{9846D6DE-BF85-4A33-B9EA-55968A0DA751}" type="datetimeFigureOut">
               <a:rPr lang="es-UY" smtClean="0"/>
-              <a:t>10/3/2023</a:t>
+              <a:t>11/3/2023</a:t>
             </a:fld>
             <a:endParaRPr lang="es-UY"/>
           </a:p>
@@ -1010,7 +1010,7 @@
           <a:p>
             <a:fld id="{9846D6DE-BF85-4A33-B9EA-55968A0DA751}" type="datetimeFigureOut">
               <a:rPr lang="es-UY" smtClean="0"/>
-              <a:t>10/3/2023</a:t>
+              <a:t>11/3/2023</a:t>
             </a:fld>
             <a:endParaRPr lang="es-UY"/>
           </a:p>
@@ -1242,7 +1242,7 @@
           <a:p>
             <a:fld id="{9846D6DE-BF85-4A33-B9EA-55968A0DA751}" type="datetimeFigureOut">
               <a:rPr lang="es-UY" smtClean="0"/>
-              <a:t>10/3/2023</a:t>
+              <a:t>11/3/2023</a:t>
             </a:fld>
             <a:endParaRPr lang="es-UY"/>
           </a:p>
@@ -1609,7 +1609,7 @@
           <a:p>
             <a:fld id="{9846D6DE-BF85-4A33-B9EA-55968A0DA751}" type="datetimeFigureOut">
               <a:rPr lang="es-UY" smtClean="0"/>
-              <a:t>10/3/2023</a:t>
+              <a:t>11/3/2023</a:t>
             </a:fld>
             <a:endParaRPr lang="es-UY"/>
           </a:p>
@@ -1727,7 +1727,7 @@
           <a:p>
             <a:fld id="{9846D6DE-BF85-4A33-B9EA-55968A0DA751}" type="datetimeFigureOut">
               <a:rPr lang="es-UY" smtClean="0"/>
-              <a:t>10/3/2023</a:t>
+              <a:t>11/3/2023</a:t>
             </a:fld>
             <a:endParaRPr lang="es-UY"/>
           </a:p>
@@ -1822,7 +1822,7 @@
           <a:p>
             <a:fld id="{9846D6DE-BF85-4A33-B9EA-55968A0DA751}" type="datetimeFigureOut">
               <a:rPr lang="es-UY" smtClean="0"/>
-              <a:t>10/3/2023</a:t>
+              <a:t>11/3/2023</a:t>
             </a:fld>
             <a:endParaRPr lang="es-UY"/>
           </a:p>
@@ -2099,7 +2099,7 @@
           <a:p>
             <a:fld id="{9846D6DE-BF85-4A33-B9EA-55968A0DA751}" type="datetimeFigureOut">
               <a:rPr lang="es-UY" smtClean="0"/>
-              <a:t>10/3/2023</a:t>
+              <a:t>11/3/2023</a:t>
             </a:fld>
             <a:endParaRPr lang="es-UY"/>
           </a:p>
@@ -2356,7 +2356,7 @@
           <a:p>
             <a:fld id="{9846D6DE-BF85-4A33-B9EA-55968A0DA751}" type="datetimeFigureOut">
               <a:rPr lang="es-UY" smtClean="0"/>
-              <a:t>10/3/2023</a:t>
+              <a:t>11/3/2023</a:t>
             </a:fld>
             <a:endParaRPr lang="es-UY"/>
           </a:p>
@@ -2569,7 +2569,7 @@
           <a:p>
             <a:fld id="{9846D6DE-BF85-4A33-B9EA-55968A0DA751}" type="datetimeFigureOut">
               <a:rPr lang="es-UY" smtClean="0"/>
-              <a:t>10/3/2023</a:t>
+              <a:t>11/3/2023</a:t>
             </a:fld>
             <a:endParaRPr lang="es-UY"/>
           </a:p>
@@ -4944,9 +4944,10 @@
             <a:avLst/>
           </a:prstGeom>
           <a:solidFill>
-            <a:srgbClr val="FFC000">
-              <a:alpha val="10000"/>
-            </a:srgbClr>
+            <a:schemeClr val="accent1">
+              <a:lumMod val="75000"/>
+              <a:alpha val="30000"/>
+            </a:schemeClr>
           </a:solidFill>
           <a:ln>
             <a:noFill/>
@@ -5013,8 +5014,13 @@
             </a:r>
             <a:r>
               <a:rPr lang="es-AR" sz="1600" dirty="0">
+                <a:solidFill>
+                  <a:schemeClr val="bg1">
+                    <a:lumMod val="95000"/>
+                  </a:schemeClr>
+                </a:solidFill>
                 <a:highlight>
-                  <a:srgbClr val="FFFF00"/>
+                  <a:srgbClr val="2F5597"/>
                 </a:highlight>
                 <a:latin typeface="Berlin Sans FB" panose="020E0602020502020306" pitchFamily="34" charset="0"/>
               </a:rPr>
@@ -5028,8 +5034,13 @@
             </a:r>
             <a:r>
               <a:rPr lang="es-AR" sz="1600" dirty="0">
+                <a:solidFill>
+                  <a:schemeClr val="bg1">
+                    <a:lumMod val="95000"/>
+                  </a:schemeClr>
+                </a:solidFill>
                 <a:highlight>
-                  <a:srgbClr val="00FF00"/>
+                  <a:srgbClr val="00B050"/>
                 </a:highlight>
                 <a:latin typeface="Berlin Sans FB" panose="020E0602020502020306" pitchFamily="34" charset="0"/>
               </a:rPr>
@@ -5264,8 +5275,8 @@
           </a:p>
         </p:txBody>
       </p:sp>
-      <mc:AlternateContent xmlns:mc="http://schemas.openxmlformats.org/markup-compatibility/2006">
-        <mc:Choice xmlns:a14="http://schemas.microsoft.com/office/drawing/2010/main" Requires="a14">
+      <mc:AlternateContent xmlns:mc="http://schemas.openxmlformats.org/markup-compatibility/2006" xmlns:a14="http://schemas.microsoft.com/office/drawing/2010/main">
+        <mc:Choice Requires="a14">
           <p:sp>
             <p:nvSpPr>
               <p:cNvPr id="20" name="TextBox 19">
@@ -5294,6 +5305,7 @@
               </a:bodyPr>
               <a:lstStyle/>
               <a:p>
+                <a:pPr/>
                 <a14:m>
                   <m:oMathPara xmlns:m="http://schemas.openxmlformats.org/officeDocument/2006/math">
                     <m:oMathParaPr>
@@ -5322,7 +5334,7 @@
             </p:txBody>
           </p:sp>
         </mc:Choice>
-        <mc:Fallback>
+        <mc:Fallback xmlns="">
           <p:sp>
             <p:nvSpPr>
               <p:cNvPr id="20" name="TextBox 19">
@@ -5519,8 +5531,8 @@
           </a:p>
         </p:txBody>
       </p:sp>
-      <mc:AlternateContent xmlns:mc="http://schemas.openxmlformats.org/markup-compatibility/2006">
-        <mc:Choice xmlns:a14="http://schemas.microsoft.com/office/drawing/2010/main" Requires="a14">
+      <mc:AlternateContent xmlns:mc="http://schemas.openxmlformats.org/markup-compatibility/2006" xmlns:a14="http://schemas.microsoft.com/office/drawing/2010/main">
+        <mc:Choice Requires="a14">
           <p:sp>
             <p:nvSpPr>
               <p:cNvPr id="53" name="TextBox 52">
@@ -5549,6 +5561,7 @@
               </a:bodyPr>
               <a:lstStyle/>
               <a:p>
+                <a:pPr/>
                 <a14:m>
                   <m:oMathPara xmlns:m="http://schemas.openxmlformats.org/officeDocument/2006/math">
                     <m:oMathParaPr>
@@ -5577,7 +5590,7 @@
             </p:txBody>
           </p:sp>
         </mc:Choice>
-        <mc:Fallback>
+        <mc:Fallback xmlns="">
           <p:sp>
             <p:nvSpPr>
               <p:cNvPr id="53" name="TextBox 52">
@@ -5622,8 +5635,8 @@
           </p:sp>
         </mc:Fallback>
       </mc:AlternateContent>
-      <mc:AlternateContent xmlns:mc="http://schemas.openxmlformats.org/markup-compatibility/2006">
-        <mc:Choice xmlns:a14="http://schemas.microsoft.com/office/drawing/2010/main" Requires="a14">
+      <mc:AlternateContent xmlns:mc="http://schemas.openxmlformats.org/markup-compatibility/2006" xmlns:a14="http://schemas.microsoft.com/office/drawing/2010/main">
+        <mc:Choice Requires="a14">
           <p:sp>
             <p:nvSpPr>
               <p:cNvPr id="54" name="Rectangle 53">
@@ -5769,7 +5782,7 @@
             </p:txBody>
           </p:sp>
         </mc:Choice>
-        <mc:Fallback>
+        <mc:Fallback xmlns="">
           <p:sp>
             <p:nvSpPr>
               <p:cNvPr id="54" name="Rectangle 53">
@@ -6096,62 +6109,6 @@
           </a:prstGeom>
         </p:spPr>
       </p:pic>
-      <p:sp>
-        <p:nvSpPr>
-          <p:cNvPr id="63" name="Rectangle 62">
-            <a:extLst>
-              <a:ext uri="{FF2B5EF4-FFF2-40B4-BE49-F238E27FC236}">
-                <a16:creationId xmlns:a16="http://schemas.microsoft.com/office/drawing/2014/main" id="{B21ED81C-BD25-4607-B37E-44AF72DF20D8}"/>
-              </a:ext>
-            </a:extLst>
-          </p:cNvPr>
-          <p:cNvSpPr/>
-          <p:nvPr/>
-        </p:nvSpPr>
-        <p:spPr>
-          <a:xfrm>
-            <a:off x="3851385" y="1270806"/>
-            <a:ext cx="4088746" cy="338554"/>
-          </a:xfrm>
-          <a:prstGeom prst="rect">
-            <a:avLst/>
-          </a:prstGeom>
-          <a:solidFill>
-            <a:schemeClr val="bg1"/>
-          </a:solidFill>
-          <a:ln>
-            <a:solidFill>
-              <a:schemeClr val="tx1">
-                <a:lumMod val="85000"/>
-                <a:lumOff val="15000"/>
-              </a:schemeClr>
-            </a:solidFill>
-            <a:prstDash val="dash"/>
-          </a:ln>
-        </p:spPr>
-        <p:txBody>
-          <a:bodyPr wrap="square" rtlCol="0">
-            <a:spAutoFit/>
-          </a:bodyPr>
-          <a:lstStyle/>
-          <a:p>
-            <a:pPr algn="ctr"/>
-            <a:r>
-              <a:rPr lang="es-AR" sz="1600">
-                <a:solidFill>
-                  <a:schemeClr val="tx1"/>
-                </a:solidFill>
-              </a:rPr>
-              <a:t>Filtros CSP</a:t>
-            </a:r>
-            <a:endParaRPr lang="es-UY" sz="1600" dirty="0">
-              <a:solidFill>
-                <a:schemeClr val="tx1"/>
-              </a:solidFill>
-            </a:endParaRPr>
-          </a:p>
-        </p:txBody>
-      </p:sp>
       <p:pic>
         <p:nvPicPr>
           <p:cNvPr id="72" name="Picture 71">
@@ -6276,8 +6233,8 @@
           </a:prstGeom>
         </p:spPr>
       </p:pic>
-      <mc:AlternateContent xmlns:mc="http://schemas.openxmlformats.org/markup-compatibility/2006">
-        <mc:Choice xmlns:a14="http://schemas.microsoft.com/office/drawing/2010/main" Requires="a14">
+      <mc:AlternateContent xmlns:mc="http://schemas.openxmlformats.org/markup-compatibility/2006" xmlns:a14="http://schemas.microsoft.com/office/drawing/2010/main">
+        <mc:Choice Requires="a14">
           <p:sp>
             <p:nvSpPr>
               <p:cNvPr id="76" name="TextBox 75">
@@ -6306,6 +6263,7 @@
               </a:bodyPr>
               <a:lstStyle/>
               <a:p>
+                <a:pPr/>
                 <a14:m>
                   <m:oMathPara xmlns:m="http://schemas.openxmlformats.org/officeDocument/2006/math">
                     <m:oMathParaPr>
@@ -6334,7 +6292,7 @@
             </p:txBody>
           </p:sp>
         </mc:Choice>
-        <mc:Fallback>
+        <mc:Fallback xmlns="">
           <p:sp>
             <p:nvSpPr>
               <p:cNvPr id="76" name="TextBox 75">
@@ -6379,8 +6337,8 @@
           </p:sp>
         </mc:Fallback>
       </mc:AlternateContent>
-      <mc:AlternateContent xmlns:mc="http://schemas.openxmlformats.org/markup-compatibility/2006">
-        <mc:Choice xmlns:a14="http://schemas.microsoft.com/office/drawing/2010/main" Requires="a14">
+      <mc:AlternateContent xmlns:mc="http://schemas.openxmlformats.org/markup-compatibility/2006" xmlns:a14="http://schemas.microsoft.com/office/drawing/2010/main">
+        <mc:Choice Requires="a14">
           <p:sp>
             <p:nvSpPr>
               <p:cNvPr id="77" name="TextBox 76">
@@ -6409,6 +6367,7 @@
               </a:bodyPr>
               <a:lstStyle/>
               <a:p>
+                <a:pPr/>
                 <a14:m>
                   <m:oMathPara xmlns:m="http://schemas.openxmlformats.org/officeDocument/2006/math">
                     <m:oMathParaPr>
@@ -6437,7 +6396,7 @@
             </p:txBody>
           </p:sp>
         </mc:Choice>
-        <mc:Fallback>
+        <mc:Fallback xmlns="">
           <p:sp>
             <p:nvSpPr>
               <p:cNvPr id="77" name="TextBox 76">
@@ -7052,62 +7011,6 @@
           </a:fontRef>
         </p:style>
       </p:cxnSp>
-      <p:sp>
-        <p:nvSpPr>
-          <p:cNvPr id="101" name="Rectangle 100">
-            <a:extLst>
-              <a:ext uri="{FF2B5EF4-FFF2-40B4-BE49-F238E27FC236}">
-                <a16:creationId xmlns:a16="http://schemas.microsoft.com/office/drawing/2014/main" id="{3646B6F6-A6AA-4F3A-B8D9-06D8C1027EBA}"/>
-              </a:ext>
-            </a:extLst>
-          </p:cNvPr>
-          <p:cNvSpPr/>
-          <p:nvPr/>
-        </p:nvSpPr>
-        <p:spPr>
-          <a:xfrm>
-            <a:off x="7920042" y="1032681"/>
-            <a:ext cx="1858946" cy="584775"/>
-          </a:xfrm>
-          <a:prstGeom prst="rect">
-            <a:avLst/>
-          </a:prstGeom>
-          <a:solidFill>
-            <a:schemeClr val="bg1"/>
-          </a:solidFill>
-          <a:ln w="12700">
-            <a:solidFill>
-              <a:schemeClr val="tx1">
-                <a:lumMod val="85000"/>
-                <a:lumOff val="15000"/>
-              </a:schemeClr>
-            </a:solidFill>
-            <a:prstDash val="dash"/>
-          </a:ln>
-        </p:spPr>
-        <p:txBody>
-          <a:bodyPr wrap="square" rtlCol="0">
-            <a:spAutoFit/>
-          </a:bodyPr>
-          <a:lstStyle/>
-          <a:p>
-            <a:pPr algn="ctr"/>
-            <a:r>
-              <a:rPr lang="es-AR" sz="1600" dirty="0">
-                <a:solidFill>
-                  <a:schemeClr val="tx1"/>
-                </a:solidFill>
-              </a:rPr>
-              <a:t>Extracción de características</a:t>
-            </a:r>
-            <a:endParaRPr lang="es-UY" sz="1600" dirty="0">
-              <a:solidFill>
-                <a:schemeClr val="tx1"/>
-              </a:solidFill>
-            </a:endParaRPr>
-          </a:p>
-        </p:txBody>
-      </p:sp>
       <p:cxnSp>
         <p:nvCxnSpPr>
           <p:cNvPr id="103" name="Straight Arrow Connector 102">
@@ -7679,8 +7582,8 @@
           </a:p>
         </p:txBody>
       </p:sp>
-      <mc:AlternateContent xmlns:mc="http://schemas.openxmlformats.org/markup-compatibility/2006">
-        <mc:Choice xmlns:a14="http://schemas.microsoft.com/office/drawing/2010/main" Requires="a14">
+      <mc:AlternateContent xmlns:mc="http://schemas.openxmlformats.org/markup-compatibility/2006" xmlns:a14="http://schemas.microsoft.com/office/drawing/2010/main">
+        <mc:Choice Requires="a14">
           <p:sp>
             <p:nvSpPr>
               <p:cNvPr id="125" name="TextBox 124">
@@ -7709,6 +7612,7 @@
               </a:bodyPr>
               <a:lstStyle/>
               <a:p>
+                <a:pPr/>
                 <a14:m>
                   <m:oMathPara xmlns:m="http://schemas.openxmlformats.org/officeDocument/2006/math">
                     <m:oMathParaPr>
@@ -7737,7 +7641,7 @@
             </p:txBody>
           </p:sp>
         </mc:Choice>
-        <mc:Fallback>
+        <mc:Fallback xmlns="">
           <p:sp>
             <p:nvSpPr>
               <p:cNvPr id="125" name="TextBox 124">
@@ -8037,6 +7941,230 @@
           </a:fontRef>
         </p:style>
       </p:cxnSp>
+      <p:sp>
+        <p:nvSpPr>
+          <p:cNvPr id="2" name="Rectangle 1">
+            <a:extLst>
+              <a:ext uri="{FF2B5EF4-FFF2-40B4-BE49-F238E27FC236}">
+                <a16:creationId xmlns:a16="http://schemas.microsoft.com/office/drawing/2014/main" id="{2B5EEECE-5C50-45D0-84DF-FDAAD1C53F2A}"/>
+              </a:ext>
+            </a:extLst>
+          </p:cNvPr>
+          <p:cNvSpPr/>
+          <p:nvPr/>
+        </p:nvSpPr>
+        <p:spPr>
+          <a:xfrm>
+            <a:off x="3851386" y="973258"/>
+            <a:ext cx="4088746" cy="630694"/>
+          </a:xfrm>
+          <a:prstGeom prst="rect">
+            <a:avLst/>
+          </a:prstGeom>
+          <a:solidFill>
+            <a:schemeClr val="accent1">
+              <a:lumMod val="75000"/>
+            </a:schemeClr>
+          </a:solidFill>
+          <a:ln w="12700">
+            <a:solidFill>
+              <a:schemeClr val="tx1"/>
+            </a:solidFill>
+            <a:prstDash val="dash"/>
+          </a:ln>
+        </p:spPr>
+        <p:style>
+          <a:lnRef idx="2">
+            <a:schemeClr val="accent1">
+              <a:shade val="50000"/>
+            </a:schemeClr>
+          </a:lnRef>
+          <a:fillRef idx="1">
+            <a:schemeClr val="accent1"/>
+          </a:fillRef>
+          <a:effectRef idx="0">
+            <a:schemeClr val="accent1"/>
+          </a:effectRef>
+          <a:fontRef idx="minor">
+            <a:schemeClr val="lt1"/>
+          </a:fontRef>
+        </p:style>
+        <p:txBody>
+          <a:bodyPr rtlCol="0" anchor="ctr"/>
+          <a:lstStyle/>
+          <a:p>
+            <a:pPr algn="ctr"/>
+            <a:endParaRPr lang="es-UY"/>
+          </a:p>
+        </p:txBody>
+      </p:sp>
+      <p:sp>
+        <p:nvSpPr>
+          <p:cNvPr id="63" name="Rectangle 62">
+            <a:extLst>
+              <a:ext uri="{FF2B5EF4-FFF2-40B4-BE49-F238E27FC236}">
+                <a16:creationId xmlns:a16="http://schemas.microsoft.com/office/drawing/2014/main" id="{B21ED81C-BD25-4607-B37E-44AF72DF20D8}"/>
+              </a:ext>
+            </a:extLst>
+          </p:cNvPr>
+          <p:cNvSpPr/>
+          <p:nvPr/>
+        </p:nvSpPr>
+        <p:spPr>
+          <a:xfrm>
+            <a:off x="3851386" y="1125298"/>
+            <a:ext cx="4088746" cy="338554"/>
+          </a:xfrm>
+          <a:prstGeom prst="rect">
+            <a:avLst/>
+          </a:prstGeom>
+          <a:solidFill>
+            <a:schemeClr val="accent1">
+              <a:lumMod val="75000"/>
+            </a:schemeClr>
+          </a:solidFill>
+          <a:ln>
+            <a:noFill/>
+            <a:prstDash val="dash"/>
+          </a:ln>
+        </p:spPr>
+        <p:txBody>
+          <a:bodyPr wrap="square" rtlCol="0">
+            <a:spAutoFit/>
+          </a:bodyPr>
+          <a:lstStyle/>
+          <a:p>
+            <a:pPr algn="ctr"/>
+            <a:r>
+              <a:rPr lang="es-AR" sz="1600" b="1">
+                <a:solidFill>
+                  <a:schemeClr val="bg1">
+                    <a:lumMod val="95000"/>
+                  </a:schemeClr>
+                </a:solidFill>
+              </a:rPr>
+              <a:t>Filtros CSP</a:t>
+            </a:r>
+            <a:endParaRPr lang="es-UY" sz="1600" b="1" dirty="0">
+              <a:solidFill>
+                <a:schemeClr val="bg1">
+                  <a:lumMod val="95000"/>
+                </a:schemeClr>
+              </a:solidFill>
+            </a:endParaRPr>
+          </a:p>
+        </p:txBody>
+      </p:sp>
+      <p:sp>
+        <p:nvSpPr>
+          <p:cNvPr id="55" name="Rectangle 54">
+            <a:extLst>
+              <a:ext uri="{FF2B5EF4-FFF2-40B4-BE49-F238E27FC236}">
+                <a16:creationId xmlns:a16="http://schemas.microsoft.com/office/drawing/2014/main" id="{E53D44CF-BDC2-47AB-9093-B6213255E0FC}"/>
+              </a:ext>
+            </a:extLst>
+          </p:cNvPr>
+          <p:cNvSpPr/>
+          <p:nvPr/>
+        </p:nvSpPr>
+        <p:spPr>
+          <a:xfrm>
+            <a:off x="7930087" y="965668"/>
+            <a:ext cx="1868991" cy="638283"/>
+          </a:xfrm>
+          <a:prstGeom prst="rect">
+            <a:avLst/>
+          </a:prstGeom>
+          <a:solidFill>
+            <a:srgbClr val="00B050"/>
+          </a:solidFill>
+          <a:ln w="12700">
+            <a:solidFill>
+              <a:schemeClr val="tx1"/>
+            </a:solidFill>
+            <a:prstDash val="dash"/>
+          </a:ln>
+        </p:spPr>
+        <p:style>
+          <a:lnRef idx="2">
+            <a:schemeClr val="accent1">
+              <a:shade val="50000"/>
+            </a:schemeClr>
+          </a:lnRef>
+          <a:fillRef idx="1">
+            <a:schemeClr val="accent1"/>
+          </a:fillRef>
+          <a:effectRef idx="0">
+            <a:schemeClr val="accent1"/>
+          </a:effectRef>
+          <a:fontRef idx="minor">
+            <a:schemeClr val="lt1"/>
+          </a:fontRef>
+        </p:style>
+        <p:txBody>
+          <a:bodyPr rtlCol="0" anchor="ctr"/>
+          <a:lstStyle/>
+          <a:p>
+            <a:pPr algn="ctr"/>
+            <a:endParaRPr lang="es-UY"/>
+          </a:p>
+        </p:txBody>
+      </p:sp>
+      <p:sp>
+        <p:nvSpPr>
+          <p:cNvPr id="101" name="Rectangle 100">
+            <a:extLst>
+              <a:ext uri="{FF2B5EF4-FFF2-40B4-BE49-F238E27FC236}">
+                <a16:creationId xmlns:a16="http://schemas.microsoft.com/office/drawing/2014/main" id="{3646B6F6-A6AA-4F3A-B8D9-06D8C1027EBA}"/>
+              </a:ext>
+            </a:extLst>
+          </p:cNvPr>
+          <p:cNvSpPr/>
+          <p:nvPr/>
+        </p:nvSpPr>
+        <p:spPr>
+          <a:xfrm>
+            <a:off x="8042686" y="1002187"/>
+            <a:ext cx="1643793" cy="584775"/>
+          </a:xfrm>
+          <a:prstGeom prst="rect">
+            <a:avLst/>
+          </a:prstGeom>
+          <a:solidFill>
+            <a:srgbClr val="00B050"/>
+          </a:solidFill>
+          <a:ln w="12700">
+            <a:noFill/>
+            <a:prstDash val="dash"/>
+          </a:ln>
+        </p:spPr>
+        <p:txBody>
+          <a:bodyPr wrap="square" rtlCol="0">
+            <a:spAutoFit/>
+          </a:bodyPr>
+          <a:lstStyle/>
+          <a:p>
+            <a:pPr algn="ctr"/>
+            <a:r>
+              <a:rPr lang="es-AR" sz="1600" b="1" dirty="0">
+                <a:solidFill>
+                  <a:schemeClr val="bg1">
+                    <a:lumMod val="95000"/>
+                  </a:schemeClr>
+                </a:solidFill>
+              </a:rPr>
+              <a:t>Extracción de características</a:t>
+            </a:r>
+            <a:endParaRPr lang="es-UY" sz="1600" b="1" dirty="0">
+              <a:solidFill>
+                <a:schemeClr val="bg1">
+                  <a:lumMod val="95000"/>
+                </a:schemeClr>
+              </a:solidFill>
+            </a:endParaRPr>
+          </a:p>
+        </p:txBody>
+      </p:sp>
     </p:spTree>
     <p:extLst>
       <p:ext uri="{BB962C8B-B14F-4D97-AF65-F5344CB8AC3E}">

</xml_diff>